<commit_message>
Fixed MongoDB steps. Setup MongoDB only for Broker.
</commit_message>
<xml_diff>
--- a/guideline-pptx/mqtt-demo-01_guideline.pptx
+++ b/guideline-pptx/mqtt-demo-01_guideline.pptx
@@ -12,11 +12,11 @@
     <p:sldId id="331" r:id="rId3"/>
     <p:sldId id="352" r:id="rId4"/>
     <p:sldId id="332" r:id="rId5"/>
-    <p:sldId id="347" r:id="rId6"/>
-    <p:sldId id="348" r:id="rId7"/>
-    <p:sldId id="346" r:id="rId8"/>
-    <p:sldId id="349" r:id="rId9"/>
-    <p:sldId id="335" r:id="rId10"/>
+    <p:sldId id="335" r:id="rId6"/>
+    <p:sldId id="347" r:id="rId7"/>
+    <p:sldId id="348" r:id="rId8"/>
+    <p:sldId id="346" r:id="rId9"/>
+    <p:sldId id="349" r:id="rId10"/>
     <p:sldId id="337" r:id="rId11"/>
     <p:sldId id="342" r:id="rId12"/>
     <p:sldId id="333" r:id="rId13"/>
@@ -221,7 +221,7 @@
           <a:p>
             <a:fld id="{8F77BEB7-B430-4EE0-A3B9-53FF4D2A08F1}" type="datetimeFigureOut">
               <a:rPr lang="en-GB" smtClean="0"/>
-              <a:t>23/11/2016</a:t>
+              <a:t>24/11/2016</a:t>
             </a:fld>
             <a:endParaRPr lang="en-GB"/>
           </a:p>
@@ -620,7 +620,7 @@
           <a:p>
             <a:fld id="{918DACC5-9C81-4A3C-9C30-177A9FF1ED3C}" type="datetime1">
               <a:rPr lang="en-GB" smtClean="0"/>
-              <a:t>23/11/2016</a:t>
+              <a:t>24/11/2016</a:t>
             </a:fld>
             <a:endParaRPr lang="en-GB"/>
           </a:p>
@@ -793,7 +793,7 @@
           <a:p>
             <a:fld id="{E1F1FE36-DA11-4699-A771-28A1F12A4E84}" type="datetime1">
               <a:rPr lang="en-GB" smtClean="0"/>
-              <a:t>23/11/2016</a:t>
+              <a:t>24/11/2016</a:t>
             </a:fld>
             <a:endParaRPr lang="en-GB"/>
           </a:p>
@@ -976,7 +976,7 @@
           <a:p>
             <a:fld id="{5D818CA4-88D4-4C80-985B-1FFAD6228E03}" type="datetime1">
               <a:rPr lang="en-GB" smtClean="0"/>
-              <a:t>23/11/2016</a:t>
+              <a:t>24/11/2016</a:t>
             </a:fld>
             <a:endParaRPr lang="en-GB"/>
           </a:p>
@@ -1149,7 +1149,7 @@
           <a:p>
             <a:fld id="{35078E67-647B-46AF-BE98-140F84A64BAA}" type="datetime1">
               <a:rPr lang="en-GB" smtClean="0"/>
-              <a:t>23/11/2016</a:t>
+              <a:t>24/11/2016</a:t>
             </a:fld>
             <a:endParaRPr lang="en-GB"/>
           </a:p>
@@ -1398,7 +1398,7 @@
           <a:p>
             <a:fld id="{BC58D4AE-FF1F-41E6-B021-DD203D067FE5}" type="datetime1">
               <a:rPr lang="en-GB" smtClean="0"/>
-              <a:t>23/11/2016</a:t>
+              <a:t>24/11/2016</a:t>
             </a:fld>
             <a:endParaRPr lang="en-GB"/>
           </a:p>
@@ -1633,7 +1633,7 @@
           <a:p>
             <a:fld id="{B91B580D-FEFC-4441-98C5-5CD2A30A26A6}" type="datetime1">
               <a:rPr lang="en-GB" smtClean="0"/>
-              <a:t>23/11/2016</a:t>
+              <a:t>24/11/2016</a:t>
             </a:fld>
             <a:endParaRPr lang="en-GB"/>
           </a:p>
@@ -2003,7 +2003,7 @@
           <a:p>
             <a:fld id="{AD971C3B-024E-4773-AE64-C83383E25150}" type="datetime1">
               <a:rPr lang="en-GB" smtClean="0"/>
-              <a:t>23/11/2016</a:t>
+              <a:t>24/11/2016</a:t>
             </a:fld>
             <a:endParaRPr lang="en-GB"/>
           </a:p>
@@ -2124,7 +2124,7 @@
           <a:p>
             <a:fld id="{81EFBAE6-5E63-4D70-B1C4-FA9EE041B05C}" type="datetime1">
               <a:rPr lang="en-GB" smtClean="0"/>
-              <a:t>23/11/2016</a:t>
+              <a:t>24/11/2016</a:t>
             </a:fld>
             <a:endParaRPr lang="en-GB"/>
           </a:p>
@@ -2222,7 +2222,7 @@
           <a:p>
             <a:fld id="{9D7F2C7F-2B74-47CD-8C12-5CD9464413F2}" type="datetime1">
               <a:rPr lang="en-GB" smtClean="0"/>
-              <a:t>23/11/2016</a:t>
+              <a:t>24/11/2016</a:t>
             </a:fld>
             <a:endParaRPr lang="en-GB"/>
           </a:p>
@@ -2502,7 +2502,7 @@
           <a:p>
             <a:fld id="{09429627-698F-4D5A-801D-4E20457CF43F}" type="datetime1">
               <a:rPr lang="en-GB" smtClean="0"/>
-              <a:t>23/11/2016</a:t>
+              <a:t>24/11/2016</a:t>
             </a:fld>
             <a:endParaRPr lang="en-GB"/>
           </a:p>
@@ -2758,7 +2758,7 @@
           <a:p>
             <a:fld id="{02BF5127-2864-4747-A6D6-6ECD9B86BD31}" type="datetime1">
               <a:rPr lang="en-GB" smtClean="0"/>
-              <a:t>23/11/2016</a:t>
+              <a:t>24/11/2016</a:t>
             </a:fld>
             <a:endParaRPr lang="en-GB"/>
           </a:p>
@@ -2974,7 +2974,7 @@
           <a:p>
             <a:fld id="{B40DF90D-B507-46AB-9E29-EA5249D99FE6}" type="datetime1">
               <a:rPr lang="en-GB" smtClean="0"/>
-              <a:t>23/11/2016</a:t>
+              <a:t>24/11/2016</a:t>
             </a:fld>
             <a:endParaRPr lang="en-GB"/>
           </a:p>
@@ -7624,7 +7624,7 @@
       </p:grpSpPr>
       <p:sp>
         <p:nvSpPr>
-          <p:cNvPr id="2" name="Title 1"/>
+          <p:cNvPr id="6" name="Title 5"/>
           <p:cNvSpPr>
             <a:spLocks noGrp="1"/>
           </p:cNvSpPr>
@@ -7639,40 +7639,34 @@
           <a:p>
             <a:r>
               <a:rPr lang="en-US" dirty="0"/>
-              <a:t>Download and install MongoDB</a:t>
-            </a:r>
-          </a:p>
-        </p:txBody>
-      </p:sp>
-      <p:pic>
-        <p:nvPicPr>
-          <p:cNvPr id="6" name="Content Placeholder 5"/>
-          <p:cNvPicPr>
-            <a:picLocks noGrp="1" noChangeAspect="1"/>
-          </p:cNvPicPr>
-          <p:nvPr>
-            <p:ph idx="1"/>
-          </p:nvPr>
-        </p:nvPicPr>
-        <p:blipFill>
-          <a:blip r:embed="rId2">
-            <a:extLst>
-              <a:ext uri="{28A0092B-C50C-407E-A947-70E740481C1C}">
-                <a14:useLocalDpi xmlns:a14="http://schemas.microsoft.com/office/drawing/2010/main" val="0"/>
-              </a:ext>
-            </a:extLst>
-          </a:blip>
-          <a:stretch>
-            <a:fillRect/>
-          </a:stretch>
-        </p:blipFill>
-        <p:spPr>
-          <a:xfrm>
-            <a:off x="838200" y="1690688"/>
-            <a:ext cx="8973143" cy="4351338"/>
-          </a:xfrm>
-        </p:spPr>
-      </p:pic>
+              <a:t>Run </a:t>
+            </a:r>
+            <a:r>
+              <a:rPr lang="en-US" b="1" u="sng" dirty="0"/>
+              <a:t>broker-mongodb.js</a:t>
+            </a:r>
+          </a:p>
+        </p:txBody>
+      </p:sp>
+      <p:sp>
+        <p:nvSpPr>
+          <p:cNvPr id="7" name="Text Placeholder 6"/>
+          <p:cNvSpPr>
+            <a:spLocks noGrp="1"/>
+          </p:cNvSpPr>
+          <p:nvPr>
+            <p:ph type="body" idx="1"/>
+          </p:nvPr>
+        </p:nvSpPr>
+        <p:spPr/>
+        <p:txBody>
+          <a:bodyPr/>
+          <a:lstStyle/>
+          <a:p>
+            <a:endParaRPr lang="en-US"/>
+          </a:p>
+        </p:txBody>
+      </p:sp>
       <p:sp>
         <p:nvSpPr>
           <p:cNvPr id="4" name="Footer Placeholder 3"/>
@@ -7718,42 +7712,10 @@
           </a:p>
         </p:txBody>
       </p:sp>
-      <p:sp>
-        <p:nvSpPr>
-          <p:cNvPr id="7" name="TextBox 6"/>
-          <p:cNvSpPr txBox="1"/>
-          <p:nvPr/>
-        </p:nvSpPr>
-        <p:spPr>
-          <a:xfrm>
-            <a:off x="2176899" y="6016486"/>
-            <a:ext cx="6656311" cy="400110"/>
-          </a:xfrm>
-          <a:prstGeom prst="rect">
-            <a:avLst/>
-          </a:prstGeom>
-          <a:noFill/>
-        </p:spPr>
-        <p:txBody>
-          <a:bodyPr wrap="square" rtlCol="0">
-            <a:spAutoFit/>
-          </a:bodyPr>
-          <a:lstStyle/>
-          <a:p>
-            <a:r>
-              <a:rPr lang="en-US" sz="2000" dirty="0">
-                <a:latin typeface="Arial" panose="020B0604020202020204" pitchFamily="34" charset="0"/>
-                <a:cs typeface="Arial" panose="020B0604020202020204" pitchFamily="34" charset="0"/>
-              </a:rPr>
-              <a:t>https://www.mongodb.com/download-center#community</a:t>
-            </a:r>
-          </a:p>
-        </p:txBody>
-      </p:sp>
     </p:spTree>
     <p:extLst>
       <p:ext uri="{BB962C8B-B14F-4D97-AF65-F5344CB8AC3E}">
-        <p14:creationId xmlns:p14="http://schemas.microsoft.com/office/powerpoint/2010/main" val="1115428741"/>
+        <p14:creationId xmlns:p14="http://schemas.microsoft.com/office/powerpoint/2010/main" val="2441463166"/>
       </p:ext>
     </p:extLst>
   </p:cSld>
@@ -7797,11 +7759,7 @@
           <a:p>
             <a:r>
               <a:rPr lang="en-US" dirty="0"/>
-              <a:t>Create directory: </a:t>
-            </a:r>
-            <a:r>
-              <a:rPr lang="en-US" b="1" u="sng" dirty="0"/>
-              <a:t>C:\data\db</a:t>
+              <a:t>Download and install MongoDB</a:t>
             </a:r>
           </a:p>
         </p:txBody>
@@ -7830,8 +7788,8 @@
         </p:blipFill>
         <p:spPr>
           <a:xfrm>
-            <a:off x="960748" y="1981836"/>
-            <a:ext cx="4648849" cy="2248214"/>
+            <a:off x="838200" y="1690688"/>
+            <a:ext cx="8973143" cy="4351338"/>
           </a:xfrm>
         </p:spPr>
       </p:pic>
@@ -7888,8 +7846,8 @@
         </p:nvSpPr>
         <p:spPr>
           <a:xfrm>
-            <a:off x="6096000" y="2500024"/>
-            <a:ext cx="3912817" cy="1015663"/>
+            <a:off x="2176899" y="6016486"/>
+            <a:ext cx="6656311" cy="400110"/>
           </a:xfrm>
           <a:prstGeom prst="rect">
             <a:avLst/>
@@ -7907,57 +7865,7 @@
                 <a:latin typeface="Arial" panose="020B0604020202020204" pitchFamily="34" charset="0"/>
                 <a:cs typeface="Arial" panose="020B0604020202020204" pitchFamily="34" charset="0"/>
               </a:rPr>
-              <a:t>Open Command prompt:</a:t>
-            </a:r>
-            <a:br>
-              <a:rPr lang="en-US" sz="2000" dirty="0">
-                <a:latin typeface="Arial" panose="020B0604020202020204" pitchFamily="34" charset="0"/>
-                <a:cs typeface="Arial" panose="020B0604020202020204" pitchFamily="34" charset="0"/>
-              </a:rPr>
-            </a:br>
-            <a:r>
-              <a:rPr lang="en-US" sz="2000" dirty="0">
-                <a:latin typeface="Arial" panose="020B0604020202020204" pitchFamily="34" charset="0"/>
-                <a:cs typeface="Arial" panose="020B0604020202020204" pitchFamily="34" charset="0"/>
-              </a:rPr>
-              <a:t>$ </a:t>
-            </a:r>
-            <a:r>
-              <a:rPr lang="en-US" sz="2000" dirty="0" err="1">
-                <a:latin typeface="Arial" panose="020B0604020202020204" pitchFamily="34" charset="0"/>
-                <a:cs typeface="Arial" panose="020B0604020202020204" pitchFamily="34" charset="0"/>
-              </a:rPr>
-              <a:t>mkdir</a:t>
-            </a:r>
-            <a:r>
-              <a:rPr lang="en-US" sz="2000" dirty="0">
-                <a:latin typeface="Arial" panose="020B0604020202020204" pitchFamily="34" charset="0"/>
-                <a:cs typeface="Arial" panose="020B0604020202020204" pitchFamily="34" charset="0"/>
-              </a:rPr>
-              <a:t> C:\data</a:t>
-            </a:r>
-          </a:p>
-          <a:p>
-            <a:r>
-              <a:rPr lang="en-US" sz="2000" dirty="0">
-                <a:latin typeface="Arial" panose="020B0604020202020204" pitchFamily="34" charset="0"/>
-                <a:cs typeface="Arial" panose="020B0604020202020204" pitchFamily="34" charset="0"/>
-              </a:rPr>
-              <a:t>$ </a:t>
-            </a:r>
-            <a:r>
-              <a:rPr lang="en-US" sz="2000" dirty="0" err="1">
-                <a:latin typeface="Arial" panose="020B0604020202020204" pitchFamily="34" charset="0"/>
-                <a:cs typeface="Arial" panose="020B0604020202020204" pitchFamily="34" charset="0"/>
-              </a:rPr>
-              <a:t>mkdir</a:t>
-            </a:r>
-            <a:r>
-              <a:rPr lang="en-US" sz="2000" dirty="0">
-                <a:latin typeface="Arial" panose="020B0604020202020204" pitchFamily="34" charset="0"/>
-                <a:cs typeface="Arial" panose="020B0604020202020204" pitchFamily="34" charset="0"/>
-              </a:rPr>
-              <a:t> C:\data\db</a:t>
+              <a:t>https://www.mongodb.com/download-center#community</a:t>
             </a:r>
           </a:p>
         </p:txBody>
@@ -7965,7 +7873,7 @@
     </p:spTree>
     <p:extLst>
       <p:ext uri="{BB962C8B-B14F-4D97-AF65-F5344CB8AC3E}">
-        <p14:creationId xmlns:p14="http://schemas.microsoft.com/office/powerpoint/2010/main" val="2509845966"/>
+        <p14:creationId xmlns:p14="http://schemas.microsoft.com/office/powerpoint/2010/main" val="1115428741"/>
       </p:ext>
     </p:extLst>
   </p:cSld>
@@ -8009,7 +7917,11 @@
           <a:p>
             <a:r>
               <a:rPr lang="en-US" dirty="0"/>
-              <a:t>Run MongoDB (mongod.exe)</a:t>
+              <a:t>Create directory: </a:t>
+            </a:r>
+            <a:r>
+              <a:rPr lang="en-US" b="1" u="sng" dirty="0"/>
+              <a:t>C:\data\db</a:t>
             </a:r>
           </a:p>
         </p:txBody>
@@ -8038,8 +7950,8 @@
         </p:blipFill>
         <p:spPr>
           <a:xfrm>
-            <a:off x="838200" y="1543347"/>
-            <a:ext cx="6434985" cy="4351338"/>
+            <a:off x="960748" y="1981836"/>
+            <a:ext cx="4648849" cy="2248214"/>
           </a:xfrm>
         </p:spPr>
       </p:pic>
@@ -8096,65 +8008,8 @@
         </p:nvSpPr>
         <p:spPr>
           <a:xfrm>
-            <a:off x="771780" y="6048573"/>
-            <a:ext cx="7738016" cy="307777"/>
-          </a:xfrm>
-          <a:prstGeom prst="rect">
-            <a:avLst/>
-          </a:prstGeom>
-          <a:solidFill>
-            <a:schemeClr val="tx1"/>
-          </a:solidFill>
-        </p:spPr>
-        <p:txBody>
-          <a:bodyPr wrap="none" rtlCol="0">
-            <a:spAutoFit/>
-          </a:bodyPr>
-          <a:lstStyle/>
-          <a:p>
-            <a:r>
-              <a:rPr lang="en-US" sz="1400" dirty="0">
-                <a:solidFill>
-                  <a:schemeClr val="bg1"/>
-                </a:solidFill>
-                <a:latin typeface="Consolas" panose="020B0609020204030204" pitchFamily="49" charset="0"/>
-                <a:cs typeface="Arial" panose="020B0604020202020204" pitchFamily="34" charset="0"/>
-              </a:rPr>
-              <a:t>$ "C:\Program Files\MongoDB\Server\3.2\bin\mongod.exe" --</a:t>
-            </a:r>
-            <a:r>
-              <a:rPr lang="en-US" sz="1400" dirty="0" err="1">
-                <a:solidFill>
-                  <a:schemeClr val="bg1"/>
-                </a:solidFill>
-                <a:latin typeface="Consolas" panose="020B0609020204030204" pitchFamily="49" charset="0"/>
-                <a:cs typeface="Arial" panose="020B0604020202020204" pitchFamily="34" charset="0"/>
-              </a:rPr>
-              <a:t>dbpath</a:t>
-            </a:r>
-            <a:r>
-              <a:rPr lang="en-US" sz="1400" dirty="0">
-                <a:solidFill>
-                  <a:schemeClr val="bg1"/>
-                </a:solidFill>
-                <a:latin typeface="Consolas" panose="020B0609020204030204" pitchFamily="49" charset="0"/>
-                <a:cs typeface="Arial" panose="020B0604020202020204" pitchFamily="34" charset="0"/>
-              </a:rPr>
-              <a:t> "C:\data\db"</a:t>
-            </a:r>
-          </a:p>
-        </p:txBody>
-      </p:sp>
-      <p:sp>
-        <p:nvSpPr>
-          <p:cNvPr id="8" name="TextBox 7"/>
-          <p:cNvSpPr txBox="1"/>
-          <p:nvPr/>
-        </p:nvSpPr>
-        <p:spPr>
-          <a:xfrm>
-            <a:off x="7717411" y="1934416"/>
-            <a:ext cx="3912817" cy="707886"/>
+            <a:off x="6096000" y="2500024"/>
+            <a:ext cx="3912817" cy="1015663"/>
           </a:xfrm>
           <a:prstGeom prst="rect">
             <a:avLst/>
@@ -8172,7 +8027,57 @@
                 <a:latin typeface="Arial" panose="020B0604020202020204" pitchFamily="34" charset="0"/>
                 <a:cs typeface="Arial" panose="020B0604020202020204" pitchFamily="34" charset="0"/>
               </a:rPr>
-              <a:t>MongoDB is successfully running.</a:t>
+              <a:t>Open Command prompt:</a:t>
+            </a:r>
+            <a:br>
+              <a:rPr lang="en-US" sz="2000" dirty="0">
+                <a:latin typeface="Arial" panose="020B0604020202020204" pitchFamily="34" charset="0"/>
+                <a:cs typeface="Arial" panose="020B0604020202020204" pitchFamily="34" charset="0"/>
+              </a:rPr>
+            </a:br>
+            <a:r>
+              <a:rPr lang="en-US" sz="2000" dirty="0">
+                <a:latin typeface="Arial" panose="020B0604020202020204" pitchFamily="34" charset="0"/>
+                <a:cs typeface="Arial" panose="020B0604020202020204" pitchFamily="34" charset="0"/>
+              </a:rPr>
+              <a:t>$ </a:t>
+            </a:r>
+            <a:r>
+              <a:rPr lang="en-US" sz="2000" dirty="0" err="1">
+                <a:latin typeface="Arial" panose="020B0604020202020204" pitchFamily="34" charset="0"/>
+                <a:cs typeface="Arial" panose="020B0604020202020204" pitchFamily="34" charset="0"/>
+              </a:rPr>
+              <a:t>mkdir</a:t>
+            </a:r>
+            <a:r>
+              <a:rPr lang="en-US" sz="2000" dirty="0">
+                <a:latin typeface="Arial" panose="020B0604020202020204" pitchFamily="34" charset="0"/>
+                <a:cs typeface="Arial" panose="020B0604020202020204" pitchFamily="34" charset="0"/>
+              </a:rPr>
+              <a:t> C:\data</a:t>
+            </a:r>
+          </a:p>
+          <a:p>
+            <a:r>
+              <a:rPr lang="en-US" sz="2000" dirty="0">
+                <a:latin typeface="Arial" panose="020B0604020202020204" pitchFamily="34" charset="0"/>
+                <a:cs typeface="Arial" panose="020B0604020202020204" pitchFamily="34" charset="0"/>
+              </a:rPr>
+              <a:t>$ </a:t>
+            </a:r>
+            <a:r>
+              <a:rPr lang="en-US" sz="2000" dirty="0" err="1">
+                <a:latin typeface="Arial" panose="020B0604020202020204" pitchFamily="34" charset="0"/>
+                <a:cs typeface="Arial" panose="020B0604020202020204" pitchFamily="34" charset="0"/>
+              </a:rPr>
+              <a:t>mkdir</a:t>
+            </a:r>
+            <a:r>
+              <a:rPr lang="en-US" sz="2000" dirty="0">
+                <a:latin typeface="Arial" panose="020B0604020202020204" pitchFamily="34" charset="0"/>
+                <a:cs typeface="Arial" panose="020B0604020202020204" pitchFamily="34" charset="0"/>
+              </a:rPr>
+              <a:t> C:\data\db</a:t>
             </a:r>
           </a:p>
         </p:txBody>
@@ -8180,7 +8085,7 @@
     </p:spTree>
     <p:extLst>
       <p:ext uri="{BB962C8B-B14F-4D97-AF65-F5344CB8AC3E}">
-        <p14:creationId xmlns:p14="http://schemas.microsoft.com/office/powerpoint/2010/main" val="3513336878"/>
+        <p14:creationId xmlns:p14="http://schemas.microsoft.com/office/powerpoint/2010/main" val="2509845966"/>
       </p:ext>
     </p:extLst>
   </p:cSld>
@@ -8224,7 +8129,7 @@
           <a:p>
             <a:r>
               <a:rPr lang="en-US" dirty="0"/>
-              <a:t>Verify: </a:t>
+              <a:t>Run MongoDB (mongod.exe)</a:t>
             </a:r>
           </a:p>
         </p:txBody>
@@ -8253,8 +8158,8 @@
         </p:blipFill>
         <p:spPr>
           <a:xfrm>
-            <a:off x="838200" y="1690688"/>
-            <a:ext cx="6356669" cy="4351338"/>
+            <a:off x="838200" y="1543347"/>
+            <a:ext cx="6434985" cy="4351338"/>
           </a:xfrm>
         </p:spPr>
       </p:pic>
@@ -8311,8 +8216,65 @@
         </p:nvSpPr>
         <p:spPr>
           <a:xfrm>
+            <a:off x="771780" y="6048573"/>
+            <a:ext cx="7738016" cy="307777"/>
+          </a:xfrm>
+          <a:prstGeom prst="rect">
+            <a:avLst/>
+          </a:prstGeom>
+          <a:solidFill>
+            <a:schemeClr val="tx1"/>
+          </a:solidFill>
+        </p:spPr>
+        <p:txBody>
+          <a:bodyPr wrap="none" rtlCol="0">
+            <a:spAutoFit/>
+          </a:bodyPr>
+          <a:lstStyle/>
+          <a:p>
+            <a:r>
+              <a:rPr lang="en-US" sz="1400" dirty="0">
+                <a:solidFill>
+                  <a:schemeClr val="bg1"/>
+                </a:solidFill>
+                <a:latin typeface="Consolas" panose="020B0609020204030204" pitchFamily="49" charset="0"/>
+                <a:cs typeface="Arial" panose="020B0604020202020204" pitchFamily="34" charset="0"/>
+              </a:rPr>
+              <a:t>$ "C:\Program Files\MongoDB\Server\3.2\bin\mongod.exe" --</a:t>
+            </a:r>
+            <a:r>
+              <a:rPr lang="en-US" sz="1400" dirty="0" err="1">
+                <a:solidFill>
+                  <a:schemeClr val="bg1"/>
+                </a:solidFill>
+                <a:latin typeface="Consolas" panose="020B0609020204030204" pitchFamily="49" charset="0"/>
+                <a:cs typeface="Arial" panose="020B0604020202020204" pitchFamily="34" charset="0"/>
+              </a:rPr>
+              <a:t>dbpath</a:t>
+            </a:r>
+            <a:r>
+              <a:rPr lang="en-US" sz="1400" dirty="0">
+                <a:solidFill>
+                  <a:schemeClr val="bg1"/>
+                </a:solidFill>
+                <a:latin typeface="Consolas" panose="020B0609020204030204" pitchFamily="49" charset="0"/>
+                <a:cs typeface="Arial" panose="020B0604020202020204" pitchFamily="34" charset="0"/>
+              </a:rPr>
+              <a:t> "C:\data\db"</a:t>
+            </a:r>
+          </a:p>
+        </p:txBody>
+      </p:sp>
+      <p:sp>
+        <p:nvSpPr>
+          <p:cNvPr id="8" name="TextBox 7"/>
+          <p:cNvSpPr txBox="1"/>
+          <p:nvPr/>
+        </p:nvSpPr>
+        <p:spPr>
+          <a:xfrm>
             <a:off x="7717411" y="1934416"/>
-            <a:ext cx="3912817" cy="1323439"/>
+            <a:ext cx="3912817" cy="707886"/>
           </a:xfrm>
           <a:prstGeom prst="rect">
             <a:avLst/>
@@ -8330,21 +8292,7 @@
                 <a:latin typeface="Arial" panose="020B0604020202020204" pitchFamily="34" charset="0"/>
                 <a:cs typeface="Arial" panose="020B0604020202020204" pitchFamily="34" charset="0"/>
               </a:rPr>
-              <a:t>MongoDB ready to receive connection. Please note that by default MongoDB runs on port </a:t>
-            </a:r>
-            <a:r>
-              <a:rPr lang="en-US" sz="2000" b="1" u="sng" dirty="0">
-                <a:latin typeface="Arial" panose="020B0604020202020204" pitchFamily="34" charset="0"/>
-                <a:cs typeface="Arial" panose="020B0604020202020204" pitchFamily="34" charset="0"/>
-              </a:rPr>
-              <a:t>27017</a:t>
-            </a:r>
-            <a:r>
-              <a:rPr lang="en-US" sz="2000" dirty="0">
-                <a:latin typeface="Arial" panose="020B0604020202020204" pitchFamily="34" charset="0"/>
-                <a:cs typeface="Arial" panose="020B0604020202020204" pitchFamily="34" charset="0"/>
-              </a:rPr>
-              <a:t>.</a:t>
+              <a:t>MongoDB is successfully running.</a:t>
             </a:r>
           </a:p>
         </p:txBody>
@@ -8352,7 +8300,7 @@
     </p:spTree>
     <p:extLst>
       <p:ext uri="{BB962C8B-B14F-4D97-AF65-F5344CB8AC3E}">
-        <p14:creationId xmlns:p14="http://schemas.microsoft.com/office/powerpoint/2010/main" val="1968158036"/>
+        <p14:creationId xmlns:p14="http://schemas.microsoft.com/office/powerpoint/2010/main" val="3513336878"/>
       </p:ext>
     </p:extLst>
   </p:cSld>
@@ -8381,7 +8329,7 @@
       </p:grpSpPr>
       <p:sp>
         <p:nvSpPr>
-          <p:cNvPr id="6" name="Title 5"/>
+          <p:cNvPr id="2" name="Title 1"/>
           <p:cNvSpPr>
             <a:spLocks noGrp="1"/>
           </p:cNvSpPr>
@@ -8396,34 +8344,40 @@
           <a:p>
             <a:r>
               <a:rPr lang="en-US" dirty="0"/>
-              <a:t>Run </a:t>
-            </a:r>
-            <a:r>
-              <a:rPr lang="en-US" b="1" u="sng" dirty="0"/>
-              <a:t>broker-mongodb.js</a:t>
-            </a:r>
-          </a:p>
-        </p:txBody>
-      </p:sp>
-      <p:sp>
-        <p:nvSpPr>
-          <p:cNvPr id="7" name="Text Placeholder 6"/>
-          <p:cNvSpPr>
-            <a:spLocks noGrp="1"/>
-          </p:cNvSpPr>
-          <p:nvPr>
-            <p:ph type="body" idx="1"/>
-          </p:nvPr>
-        </p:nvSpPr>
-        <p:spPr/>
-        <p:txBody>
-          <a:bodyPr/>
-          <a:lstStyle/>
-          <a:p>
-            <a:endParaRPr lang="en-US"/>
-          </a:p>
-        </p:txBody>
-      </p:sp>
+              <a:t>Verify: </a:t>
+            </a:r>
+          </a:p>
+        </p:txBody>
+      </p:sp>
+      <p:pic>
+        <p:nvPicPr>
+          <p:cNvPr id="6" name="Content Placeholder 5"/>
+          <p:cNvPicPr>
+            <a:picLocks noGrp="1" noChangeAspect="1"/>
+          </p:cNvPicPr>
+          <p:nvPr>
+            <p:ph idx="1"/>
+          </p:nvPr>
+        </p:nvPicPr>
+        <p:blipFill>
+          <a:blip r:embed="rId2">
+            <a:extLst>
+              <a:ext uri="{28A0092B-C50C-407E-A947-70E740481C1C}">
+                <a14:useLocalDpi xmlns:a14="http://schemas.microsoft.com/office/drawing/2010/main" val="0"/>
+              </a:ext>
+            </a:extLst>
+          </a:blip>
+          <a:stretch>
+            <a:fillRect/>
+          </a:stretch>
+        </p:blipFill>
+        <p:spPr>
+          <a:xfrm>
+            <a:off x="838200" y="1690688"/>
+            <a:ext cx="6356669" cy="4351338"/>
+          </a:xfrm>
+        </p:spPr>
+      </p:pic>
       <p:sp>
         <p:nvSpPr>
           <p:cNvPr id="4" name="Footer Placeholder 3"/>
@@ -8469,10 +8423,56 @@
           </a:p>
         </p:txBody>
       </p:sp>
+      <p:sp>
+        <p:nvSpPr>
+          <p:cNvPr id="7" name="TextBox 6"/>
+          <p:cNvSpPr txBox="1"/>
+          <p:nvPr/>
+        </p:nvSpPr>
+        <p:spPr>
+          <a:xfrm>
+            <a:off x="7717411" y="1934416"/>
+            <a:ext cx="3912817" cy="1323439"/>
+          </a:xfrm>
+          <a:prstGeom prst="rect">
+            <a:avLst/>
+          </a:prstGeom>
+          <a:noFill/>
+        </p:spPr>
+        <p:txBody>
+          <a:bodyPr wrap="square" rtlCol="0">
+            <a:spAutoFit/>
+          </a:bodyPr>
+          <a:lstStyle/>
+          <a:p>
+            <a:r>
+              <a:rPr lang="en-US" sz="2000" dirty="0">
+                <a:latin typeface="Arial" panose="020B0604020202020204" pitchFamily="34" charset="0"/>
+                <a:cs typeface="Arial" panose="020B0604020202020204" pitchFamily="34" charset="0"/>
+              </a:rPr>
+              <a:t>MongoDB ready to receive connection. Please note that by default MongoDB runs on port </a:t>
+            </a:r>
+            <a:r>
+              <a:rPr lang="en-US" sz="2000" b="1" u="sng" dirty="0">
+                <a:latin typeface="Arial" panose="020B0604020202020204" pitchFamily="34" charset="0"/>
+                <a:cs typeface="Arial" panose="020B0604020202020204" pitchFamily="34" charset="0"/>
+              </a:rPr>
+              <a:t>27017</a:t>
+            </a:r>
+            <a:r>
+              <a:rPr lang="en-US" sz="2000" dirty="0">
+                <a:latin typeface="Arial" panose="020B0604020202020204" pitchFamily="34" charset="0"/>
+                <a:cs typeface="Arial" panose="020B0604020202020204" pitchFamily="34" charset="0"/>
+              </a:rPr>
+              <a:t>.</a:t>
+            </a:r>
+          </a:p>
+        </p:txBody>
+      </p:sp>
     </p:spTree>
     <p:extLst>
       <p:ext uri="{BB962C8B-B14F-4D97-AF65-F5344CB8AC3E}">
-        <p14:creationId xmlns:p14="http://schemas.microsoft.com/office/powerpoint/2010/main" val="2441463166"/>
+        <p14:creationId xmlns:p14="http://schemas.microsoft.com/office/powerpoint/2010/main" val="1968158036"/>
       </p:ext>
     </p:extLst>
   </p:cSld>

</xml_diff>